<commit_message>
fixed black stripe on table headers
</commit_message>
<xml_diff>
--- a/entrepreneurship_styles.pptx
+++ b/entrepreneurship_styles.pptx
@@ -292,7 +292,7 @@
           <a:p>
             <a:fld id="{8EB41EDE-76F8-194F-86A0-E34104B94575}" type="datetimeFigureOut">
               <a:rPr lang="en-US" smtClean="0"/>
-              <a:t>10/6/16</a:t>
+              <a:t>10/11/16</a:t>
             </a:fld>
             <a:endParaRPr lang="en-US"/>
           </a:p>
@@ -462,7 +462,7 @@
           <a:p>
             <a:fld id="{8EB41EDE-76F8-194F-86A0-E34104B94575}" type="datetimeFigureOut">
               <a:rPr lang="en-US" smtClean="0"/>
-              <a:t>10/6/16</a:t>
+              <a:t>10/11/16</a:t>
             </a:fld>
             <a:endParaRPr lang="en-US"/>
           </a:p>
@@ -642,7 +642,7 @@
           <a:p>
             <a:fld id="{8EB41EDE-76F8-194F-86A0-E34104B94575}" type="datetimeFigureOut">
               <a:rPr lang="en-US" smtClean="0"/>
-              <a:t>10/6/16</a:t>
+              <a:t>10/11/16</a:t>
             </a:fld>
             <a:endParaRPr lang="en-US"/>
           </a:p>
@@ -812,7 +812,7 @@
           <a:p>
             <a:fld id="{8EB41EDE-76F8-194F-86A0-E34104B94575}" type="datetimeFigureOut">
               <a:rPr lang="en-US" smtClean="0"/>
-              <a:t>10/6/16</a:t>
+              <a:t>10/11/16</a:t>
             </a:fld>
             <a:endParaRPr lang="en-US"/>
           </a:p>
@@ -1058,7 +1058,7 @@
           <a:p>
             <a:fld id="{8EB41EDE-76F8-194F-86A0-E34104B94575}" type="datetimeFigureOut">
               <a:rPr lang="en-US" smtClean="0"/>
-              <a:t>10/6/16</a:t>
+              <a:t>10/11/16</a:t>
             </a:fld>
             <a:endParaRPr lang="en-US"/>
           </a:p>
@@ -1346,7 +1346,7 @@
           <a:p>
             <a:fld id="{8EB41EDE-76F8-194F-86A0-E34104B94575}" type="datetimeFigureOut">
               <a:rPr lang="en-US" smtClean="0"/>
-              <a:t>10/6/16</a:t>
+              <a:t>10/11/16</a:t>
             </a:fld>
             <a:endParaRPr lang="en-US"/>
           </a:p>
@@ -1768,7 +1768,7 @@
           <a:p>
             <a:fld id="{8EB41EDE-76F8-194F-86A0-E34104B94575}" type="datetimeFigureOut">
               <a:rPr lang="en-US" smtClean="0"/>
-              <a:t>10/6/16</a:t>
+              <a:t>10/11/16</a:t>
             </a:fld>
             <a:endParaRPr lang="en-US"/>
           </a:p>
@@ -1886,7 +1886,7 @@
           <a:p>
             <a:fld id="{8EB41EDE-76F8-194F-86A0-E34104B94575}" type="datetimeFigureOut">
               <a:rPr lang="en-US" smtClean="0"/>
-              <a:t>10/6/16</a:t>
+              <a:t>10/11/16</a:t>
             </a:fld>
             <a:endParaRPr lang="en-US"/>
           </a:p>
@@ -1981,7 +1981,7 @@
           <a:p>
             <a:fld id="{8EB41EDE-76F8-194F-86A0-E34104B94575}" type="datetimeFigureOut">
               <a:rPr lang="en-US" smtClean="0"/>
-              <a:t>10/6/16</a:t>
+              <a:t>10/11/16</a:t>
             </a:fld>
             <a:endParaRPr lang="en-US"/>
           </a:p>
@@ -2258,7 +2258,7 @@
           <a:p>
             <a:fld id="{8EB41EDE-76F8-194F-86A0-E34104B94575}" type="datetimeFigureOut">
               <a:rPr lang="en-US" smtClean="0"/>
-              <a:t>10/6/16</a:t>
+              <a:t>10/11/16</a:t>
             </a:fld>
             <a:endParaRPr lang="en-US"/>
           </a:p>
@@ -2511,7 +2511,7 @@
           <a:p>
             <a:fld id="{8EB41EDE-76F8-194F-86A0-E34104B94575}" type="datetimeFigureOut">
               <a:rPr lang="en-US" smtClean="0"/>
-              <a:t>10/6/16</a:t>
+              <a:t>10/11/16</a:t>
             </a:fld>
             <a:endParaRPr lang="en-US"/>
           </a:p>
@@ -2724,7 +2724,7 @@
           <a:p>
             <a:fld id="{8EB41EDE-76F8-194F-86A0-E34104B94575}" type="datetimeFigureOut">
               <a:rPr lang="en-US" smtClean="0"/>
-              <a:t>10/6/16</a:t>
+              <a:t>10/11/16</a:t>
             </a:fld>
             <a:endParaRPr lang="en-US"/>
           </a:p>
@@ -3114,7 +3114,7 @@
             <a:avLst/>
           </a:prstGeom>
           <a:solidFill>
-            <a:srgbClr val="5198FF"/>
+            <a:srgbClr val="22A6F5"/>
           </a:solidFill>
           <a:ln>
             <a:noFill/>
@@ -3203,7 +3203,7 @@
               <a:avLst/>
             </a:prstGeom>
             <a:solidFill>
-              <a:srgbClr val="5198FF"/>
+              <a:srgbClr val="22A6F5"/>
             </a:solidFill>
             <a:ln>
               <a:noFill/>
@@ -3407,9 +3407,7 @@
             <a:avLst/>
           </a:prstGeom>
           <a:solidFill>
-            <a:schemeClr val="bg1">
-              <a:lumMod val="85000"/>
-            </a:schemeClr>
+            <a:srgbClr val="F2F2F2"/>
           </a:solidFill>
           <a:ln>
             <a:noFill/>

</xml_diff>

<commit_message>
Bigger banner indicators on PDF report
</commit_message>
<xml_diff>
--- a/entrepreneurship_styles.pptx
+++ b/entrepreneurship_styles.pptx
@@ -7,9 +7,10 @@
   <p:sldIdLst>
     <p:sldId id="256" r:id="rId2"/>
     <p:sldId id="258" r:id="rId3"/>
-    <p:sldId id="257" r:id="rId4"/>
-    <p:sldId id="259" r:id="rId5"/>
-    <p:sldId id="260" r:id="rId6"/>
+    <p:sldId id="261" r:id="rId4"/>
+    <p:sldId id="257" r:id="rId5"/>
+    <p:sldId id="259" r:id="rId6"/>
+    <p:sldId id="260" r:id="rId7"/>
   </p:sldIdLst>
   <p:sldSz cx="9144000" cy="6858000" type="screen4x3"/>
   <p:notesSz cx="6858000" cy="9144000"/>
@@ -292,7 +293,7 @@
           <a:p>
             <a:fld id="{8EB41EDE-76F8-194F-86A0-E34104B94575}" type="datetimeFigureOut">
               <a:rPr lang="en-US" smtClean="0"/>
-              <a:t>10/11/16</a:t>
+              <a:t>12/17/16</a:t>
             </a:fld>
             <a:endParaRPr lang="en-US"/>
           </a:p>
@@ -462,7 +463,7 @@
           <a:p>
             <a:fld id="{8EB41EDE-76F8-194F-86A0-E34104B94575}" type="datetimeFigureOut">
               <a:rPr lang="en-US" smtClean="0"/>
-              <a:t>10/11/16</a:t>
+              <a:t>12/17/16</a:t>
             </a:fld>
             <a:endParaRPr lang="en-US"/>
           </a:p>
@@ -642,7 +643,7 @@
           <a:p>
             <a:fld id="{8EB41EDE-76F8-194F-86A0-E34104B94575}" type="datetimeFigureOut">
               <a:rPr lang="en-US" smtClean="0"/>
-              <a:t>10/11/16</a:t>
+              <a:t>12/17/16</a:t>
             </a:fld>
             <a:endParaRPr lang="en-US"/>
           </a:p>
@@ -812,7 +813,7 @@
           <a:p>
             <a:fld id="{8EB41EDE-76F8-194F-86A0-E34104B94575}" type="datetimeFigureOut">
               <a:rPr lang="en-US" smtClean="0"/>
-              <a:t>10/11/16</a:t>
+              <a:t>12/17/16</a:t>
             </a:fld>
             <a:endParaRPr lang="en-US"/>
           </a:p>
@@ -1058,7 +1059,7 @@
           <a:p>
             <a:fld id="{8EB41EDE-76F8-194F-86A0-E34104B94575}" type="datetimeFigureOut">
               <a:rPr lang="en-US" smtClean="0"/>
-              <a:t>10/11/16</a:t>
+              <a:t>12/17/16</a:t>
             </a:fld>
             <a:endParaRPr lang="en-US"/>
           </a:p>
@@ -1346,7 +1347,7 @@
           <a:p>
             <a:fld id="{8EB41EDE-76F8-194F-86A0-E34104B94575}" type="datetimeFigureOut">
               <a:rPr lang="en-US" smtClean="0"/>
-              <a:t>10/11/16</a:t>
+              <a:t>12/17/16</a:t>
             </a:fld>
             <a:endParaRPr lang="en-US"/>
           </a:p>
@@ -1768,7 +1769,7 @@
           <a:p>
             <a:fld id="{8EB41EDE-76F8-194F-86A0-E34104B94575}" type="datetimeFigureOut">
               <a:rPr lang="en-US" smtClean="0"/>
-              <a:t>10/11/16</a:t>
+              <a:t>12/17/16</a:t>
             </a:fld>
             <a:endParaRPr lang="en-US"/>
           </a:p>
@@ -1886,7 +1887,7 @@
           <a:p>
             <a:fld id="{8EB41EDE-76F8-194F-86A0-E34104B94575}" type="datetimeFigureOut">
               <a:rPr lang="en-US" smtClean="0"/>
-              <a:t>10/11/16</a:t>
+              <a:t>12/17/16</a:t>
             </a:fld>
             <a:endParaRPr lang="en-US"/>
           </a:p>
@@ -1981,7 +1982,7 @@
           <a:p>
             <a:fld id="{8EB41EDE-76F8-194F-86A0-E34104B94575}" type="datetimeFigureOut">
               <a:rPr lang="en-US" smtClean="0"/>
-              <a:t>10/11/16</a:t>
+              <a:t>12/17/16</a:t>
             </a:fld>
             <a:endParaRPr lang="en-US"/>
           </a:p>
@@ -2258,7 +2259,7 @@
           <a:p>
             <a:fld id="{8EB41EDE-76F8-194F-86A0-E34104B94575}" type="datetimeFigureOut">
               <a:rPr lang="en-US" smtClean="0"/>
-              <a:t>10/11/16</a:t>
+              <a:t>12/17/16</a:t>
             </a:fld>
             <a:endParaRPr lang="en-US"/>
           </a:p>
@@ -2511,7 +2512,7 @@
           <a:p>
             <a:fld id="{8EB41EDE-76F8-194F-86A0-E34104B94575}" type="datetimeFigureOut">
               <a:rPr lang="en-US" smtClean="0"/>
-              <a:t>10/11/16</a:t>
+              <a:t>12/17/16</a:t>
             </a:fld>
             <a:endParaRPr lang="en-US"/>
           </a:p>
@@ -2724,7 +2725,7 @@
           <a:p>
             <a:fld id="{8EB41EDE-76F8-194F-86A0-E34104B94575}" type="datetimeFigureOut">
               <a:rPr lang="en-US" smtClean="0"/>
-              <a:t>10/11/16</a:t>
+              <a:t>12/17/16</a:t>
             </a:fld>
             <a:endParaRPr lang="en-US"/>
           </a:p>
@@ -3313,6 +3314,145 @@
           <a:chExt cx="0" cy="0"/>
         </a:xfrm>
       </p:grpSpPr>
+      <p:grpSp>
+        <p:nvGrpSpPr>
+          <p:cNvPr id="5" name="Group 4"/>
+          <p:cNvGrpSpPr/>
+          <p:nvPr/>
+        </p:nvGrpSpPr>
+        <p:grpSpPr>
+          <a:xfrm>
+            <a:off x="0" y="0"/>
+            <a:ext cx="9144000" cy="2552718"/>
+            <a:chOff x="0" y="0"/>
+            <a:chExt cx="9144000" cy="2552718"/>
+          </a:xfrm>
+        </p:grpSpPr>
+        <p:sp>
+          <p:nvSpPr>
+            <p:cNvPr id="4" name="Rectangle 3"/>
+            <p:cNvSpPr/>
+            <p:nvPr/>
+          </p:nvSpPr>
+          <p:spPr>
+            <a:xfrm>
+              <a:off x="0" y="0"/>
+              <a:ext cx="9144000" cy="2163979"/>
+            </a:xfrm>
+            <a:prstGeom prst="rect">
+              <a:avLst/>
+            </a:prstGeom>
+            <a:solidFill>
+              <a:srgbClr val="22A6F5"/>
+            </a:solidFill>
+            <a:ln>
+              <a:noFill/>
+            </a:ln>
+            <a:effectLst/>
+          </p:spPr>
+          <p:style>
+            <a:lnRef idx="1">
+              <a:schemeClr val="accent1"/>
+            </a:lnRef>
+            <a:fillRef idx="3">
+              <a:schemeClr val="accent1"/>
+            </a:fillRef>
+            <a:effectRef idx="2">
+              <a:schemeClr val="accent1"/>
+            </a:effectRef>
+            <a:fontRef idx="minor">
+              <a:schemeClr val="lt1"/>
+            </a:fontRef>
+          </p:style>
+          <p:txBody>
+            <a:bodyPr rtlCol="0" anchor="ctr"/>
+            <a:lstStyle/>
+            <a:p>
+              <a:pPr algn="ctr"/>
+              <a:endParaRPr lang="en-US"/>
+            </a:p>
+          </p:txBody>
+        </p:sp>
+        <p:sp>
+          <p:nvSpPr>
+            <p:cNvPr id="3" name="Rectangle 2"/>
+            <p:cNvSpPr/>
+            <p:nvPr/>
+          </p:nvSpPr>
+          <p:spPr>
+            <a:xfrm>
+              <a:off x="4289338" y="0"/>
+              <a:ext cx="4755853" cy="2552718"/>
+            </a:xfrm>
+            <a:prstGeom prst="rect">
+              <a:avLst/>
+            </a:prstGeom>
+            <a:solidFill>
+              <a:schemeClr val="bg1"/>
+            </a:solidFill>
+            <a:ln w="38100" cmpd="sng">
+              <a:solidFill>
+                <a:schemeClr val="bg1">
+                  <a:lumMod val="50000"/>
+                </a:schemeClr>
+              </a:solidFill>
+            </a:ln>
+            <a:effectLst/>
+          </p:spPr>
+          <p:style>
+            <a:lnRef idx="1">
+              <a:schemeClr val="accent1"/>
+            </a:lnRef>
+            <a:fillRef idx="3">
+              <a:schemeClr val="accent1"/>
+            </a:fillRef>
+            <a:effectRef idx="2">
+              <a:schemeClr val="accent1"/>
+            </a:effectRef>
+            <a:fontRef idx="minor">
+              <a:schemeClr val="lt1"/>
+            </a:fontRef>
+          </p:style>
+          <p:txBody>
+            <a:bodyPr rtlCol="0" anchor="ctr"/>
+            <a:lstStyle/>
+            <a:p>
+              <a:pPr algn="ctr"/>
+              <a:endParaRPr lang="en-US"/>
+            </a:p>
+          </p:txBody>
+        </p:sp>
+      </p:grpSp>
+    </p:spTree>
+    <p:extLst>
+      <p:ext uri="{BB962C8B-B14F-4D97-AF65-F5344CB8AC3E}">
+        <p14:creationId xmlns:p14="http://schemas.microsoft.com/office/powerpoint/2010/main" val="3716502932"/>
+      </p:ext>
+    </p:extLst>
+  </p:cSld>
+  <p:clrMapOvr>
+    <a:masterClrMapping/>
+  </p:clrMapOvr>
+</p:sld>
+</file>
+
+<file path=ppt/slides/slide4.xml><?xml version="1.0" encoding="utf-8"?>
+<p:sld xmlns:a="http://schemas.openxmlformats.org/drawingml/2006/main" xmlns:r="http://schemas.openxmlformats.org/officeDocument/2006/relationships" xmlns:p="http://schemas.openxmlformats.org/presentationml/2006/main">
+  <p:cSld>
+    <p:spTree>
+      <p:nvGrpSpPr>
+        <p:cNvPr id="1" name=""/>
+        <p:cNvGrpSpPr/>
+        <p:nvPr/>
+      </p:nvGrpSpPr>
+      <p:grpSpPr>
+        <a:xfrm>
+          <a:off x="0" y="0"/>
+          <a:ext cx="0" cy="0"/>
+          <a:chOff x="0" y="0"/>
+          <a:chExt cx="0" cy="0"/>
+        </a:xfrm>
+      </p:grpSpPr>
       <p:sp>
         <p:nvSpPr>
           <p:cNvPr id="4" name="Rectangle 3"/>
@@ -3375,7 +3515,7 @@
 </p:sld>
 </file>
 
-<file path=ppt/slides/slide4.xml><?xml version="1.0" encoding="utf-8"?>
+<file path=ppt/slides/slide5.xml><?xml version="1.0" encoding="utf-8"?>
 <p:sld xmlns:a="http://schemas.openxmlformats.org/drawingml/2006/main" xmlns:r="http://schemas.openxmlformats.org/officeDocument/2006/relationships" xmlns:p="http://schemas.openxmlformats.org/presentationml/2006/main">
   <p:cSld>
     <p:spTree>
@@ -3450,7 +3590,7 @@
 </p:sld>
 </file>
 
-<file path=ppt/slides/slide5.xml><?xml version="1.0" encoding="utf-8"?>
+<file path=ppt/slides/slide6.xml><?xml version="1.0" encoding="utf-8"?>
 <p:sld xmlns:a="http://schemas.openxmlformats.org/drawingml/2006/main" xmlns:r="http://schemas.openxmlformats.org/officeDocument/2006/relationships" xmlns:p="http://schemas.openxmlformats.org/presentationml/2006/main">
   <p:cSld>
     <p:spTree>

</xml_diff>